<commit_message>
Updated presentation for lab 07
</commit_message>
<xml_diff>
--- a/07_Bonus/PV239-Xamarin-07_Bonus.pptx
+++ b/07_Bonus/PV239-Xamarin-07_Bonus.pptx
@@ -15,10 +15,10 @@
     <p:sldId id="408" r:id="rId6"/>
     <p:sldId id="414" r:id="rId7"/>
     <p:sldId id="409" r:id="rId8"/>
-    <p:sldId id="418" r:id="rId9"/>
-    <p:sldId id="421" r:id="rId10"/>
-    <p:sldId id="419" r:id="rId11"/>
-    <p:sldId id="422" r:id="rId12"/>
+    <p:sldId id="419" r:id="rId9"/>
+    <p:sldId id="422" r:id="rId10"/>
+    <p:sldId id="418" r:id="rId11"/>
+    <p:sldId id="421" r:id="rId12"/>
     <p:sldId id="420" r:id="rId13"/>
     <p:sldId id="423" r:id="rId14"/>
     <p:sldId id="425" r:id="rId15"/>
@@ -147,10 +147,10 @@
         </p14:section>
         <p14:section name="Užitečné nástroje" id="{AFEBFAF9-DC2E-4ACD-B1AE-DBF3B3CAFF73}">
           <p14:sldIdLst>
+            <p14:sldId id="419"/>
+            <p14:sldId id="422"/>
             <p14:sldId id="418"/>
             <p14:sldId id="421"/>
-            <p14:sldId id="419"/>
-            <p14:sldId id="422"/>
             <p14:sldId id="420"/>
             <p14:sldId id="423"/>
           </p14:sldIdLst>
@@ -44663,7 +44663,7 @@
           <p:cNvPr id="2" name="Title 1">
             <a:extLst>
               <a:ext uri="{FF2B5EF4-FFF2-40B4-BE49-F238E27FC236}">
-                <a16:creationId xmlns:a16="http://schemas.microsoft.com/office/drawing/2014/main" id="{0103BE05-8EF7-4510-9EFA-506F351DB22A}"/>
+                <a16:creationId xmlns:a16="http://schemas.microsoft.com/office/drawing/2014/main" id="{998C28BD-DA8B-42D2-91AD-871797D664C5}"/>
               </a:ext>
             </a:extLst>
           </p:cNvPr>
@@ -44680,18 +44680,9 @@
           <a:lstStyle/>
           <a:p>
             <a:r>
-              <a:rPr lang="sk-SK" dirty="0" err="1"/>
-              <a:t>Užitečné</a:t>
-            </a:r>
-            <a:r>
-              <a:rPr lang="sk-SK" dirty="0"/>
-              <a:t> nástroje – </a:t>
-            </a:r>
-            <a:r>
-              <a:rPr lang="sk-SK" dirty="0" err="1"/>
-              <a:t>debuggování</a:t>
-            </a:r>
-            <a:endParaRPr lang="en-US" dirty="0"/>
+              <a:rPr lang="cs-CZ" dirty="0"/>
+              <a:t>Užitečné nástroje – práce s telefonem</a:t>
+            </a:r>
           </a:p>
         </p:txBody>
       </p:sp>
@@ -44700,7 +44691,7 @@
           <p:cNvPr id="3" name="Content Placeholder 2">
             <a:extLst>
               <a:ext uri="{FF2B5EF4-FFF2-40B4-BE49-F238E27FC236}">
-                <a16:creationId xmlns:a16="http://schemas.microsoft.com/office/drawing/2014/main" id="{B79E931B-E621-4BB7-B0EB-4BD6348699F1}"/>
+                <a16:creationId xmlns:a16="http://schemas.microsoft.com/office/drawing/2014/main" id="{8C995FE1-285B-4A4A-A1F4-5D590309D79D}"/>
               </a:ext>
             </a:extLst>
           </p:cNvPr>
@@ -44713,7 +44704,9 @@
         </p:nvSpPr>
         <p:spPr/>
         <p:txBody>
-          <a:bodyPr/>
+          <a:bodyPr>
+            <a:normAutofit lnSpcReduction="10000"/>
+          </a:bodyPr>
           <a:lstStyle/>
           <a:p>
             <a:pPr>
@@ -44722,19 +44715,21 @@
             </a:pPr>
             <a:r>
               <a:rPr lang="sk-SK" dirty="0"/>
-              <a:t> XAML </a:t>
+              <a:t> </a:t>
             </a:r>
             <a:r>
               <a:rPr lang="sk-SK" dirty="0" err="1"/>
-              <a:t>Binding</a:t>
+              <a:t>scrcpy</a:t>
             </a:r>
             <a:r>
               <a:rPr lang="sk-SK" dirty="0"/>
-              <a:t> </a:t>
-            </a:r>
-            <a:r>
-              <a:rPr lang="sk-SK" dirty="0" err="1"/>
-              <a:t>Failures</a:t>
+              <a:t> - </a:t>
+            </a:r>
+            <a:r>
+              <a:rPr lang="sk-SK" dirty="0">
+                <a:hlinkClick r:id="rId2"/>
+              </a:rPr>
+              <a:t>https://github.com/Genymobile/scrcpy</a:t>
             </a:r>
             <a:endParaRPr lang="sk-SK" dirty="0"/>
           </a:p>
@@ -44744,12 +44739,24 @@
               <a:buChar char="•"/>
             </a:pPr>
             <a:r>
+              <a:rPr lang="sk-SK" dirty="0" err="1"/>
+              <a:t>Zobrazování</a:t>
+            </a:r>
+            <a:r>
               <a:rPr lang="sk-SK" dirty="0"/>
-              <a:t>Zobrazí chyby v </a:t>
+              <a:t> obrazovky </a:t>
             </a:r>
             <a:r>
               <a:rPr lang="sk-SK" dirty="0" err="1"/>
-              <a:t>bindingu</a:t>
+              <a:t>telefonu</a:t>
+            </a:r>
+            <a:r>
+              <a:rPr lang="sk-SK" dirty="0"/>
+              <a:t> na PC + </a:t>
+            </a:r>
+            <a:r>
+              <a:rPr lang="sk-SK" dirty="0" err="1"/>
+              <a:t>možnost</a:t>
             </a:r>
             <a:r>
               <a:rPr lang="sk-SK" dirty="0"/>
@@ -44757,23 +44764,131 @@
             </a:r>
             <a:r>
               <a:rPr lang="sk-SK" dirty="0" err="1"/>
-              <a:t>při</a:t>
-            </a:r>
+              <a:t>interakce</a:t>
+            </a:r>
+            <a:endParaRPr lang="sk-SK" dirty="0"/>
+          </a:p>
+          <a:p>
+            <a:pPr lvl="1">
+              <a:buFont typeface="Arial" panose="020B0604020202020204" pitchFamily="34" charset="0"/>
+              <a:buChar char="•"/>
+            </a:pPr>
+            <a:r>
+              <a:rPr lang="sk-SK" dirty="0"/>
+              <a:t>CLI nástroj, jednoduchý </a:t>
+            </a:r>
+            <a:r>
+              <a:rPr lang="sk-SK" dirty="0" err="1"/>
+              <a:t>setup</a:t>
+            </a:r>
+            <a:r>
+              <a:rPr lang="sk-SK" dirty="0"/>
+              <a:t>, </a:t>
+            </a:r>
+            <a:r>
+              <a:rPr lang="sk-SK" dirty="0" err="1"/>
+              <a:t>free</a:t>
+            </a:r>
+            <a:r>
+              <a:rPr lang="sk-SK" dirty="0"/>
+              <a:t>, pro Android</a:t>
+            </a:r>
+          </a:p>
+          <a:p>
+            <a:pPr>
+              <a:buFont typeface="Arial" panose="020B0604020202020204" pitchFamily="34" charset="0"/>
+              <a:buChar char="•"/>
+            </a:pPr>
             <a:r>
               <a:rPr lang="sk-SK" dirty="0"/>
               <a:t> </a:t>
             </a:r>
             <a:r>
               <a:rPr lang="sk-SK" dirty="0" err="1"/>
-              <a:t>kompilaci</a:t>
+              <a:t>QuickTime</a:t>
             </a:r>
             <a:r>
               <a:rPr lang="sk-SK" dirty="0"/>
-              <a:t> i za </a:t>
+              <a:t> </a:t>
             </a:r>
             <a:r>
               <a:rPr lang="sk-SK" dirty="0" err="1"/>
-              <a:t>běhu</a:t>
+              <a:t>Player</a:t>
+            </a:r>
+            <a:r>
+              <a:rPr lang="sk-SK" dirty="0"/>
+              <a:t>, </a:t>
+            </a:r>
+            <a:r>
+              <a:rPr lang="sk-SK" dirty="0" err="1"/>
+              <a:t>Vysor</a:t>
+            </a:r>
+            <a:endParaRPr lang="sk-SK" dirty="0"/>
+          </a:p>
+          <a:p>
+            <a:pPr lvl="1">
+              <a:buFont typeface="Arial" panose="020B0604020202020204" pitchFamily="34" charset="0"/>
+              <a:buChar char="•"/>
+            </a:pPr>
+            <a:r>
+              <a:rPr lang="sk-SK" dirty="0" err="1"/>
+              <a:t>Zobrazování</a:t>
+            </a:r>
+            <a:r>
+              <a:rPr lang="sk-SK" dirty="0"/>
+              <a:t> obrazovky z iPhone (QT </a:t>
+            </a:r>
+            <a:r>
+              <a:rPr lang="sk-SK" dirty="0" err="1"/>
+              <a:t>Player</a:t>
+            </a:r>
+            <a:r>
+              <a:rPr lang="sk-SK" dirty="0"/>
+              <a:t> – Mac OS)</a:t>
+            </a:r>
+          </a:p>
+          <a:p>
+            <a:pPr lvl="1">
+              <a:buFont typeface="Arial" panose="020B0604020202020204" pitchFamily="34" charset="0"/>
+              <a:buChar char="•"/>
+            </a:pPr>
+            <a:r>
+              <a:rPr lang="sk-SK" dirty="0"/>
+              <a:t>QT </a:t>
+            </a:r>
+            <a:r>
+              <a:rPr lang="sk-SK" dirty="0" err="1"/>
+              <a:t>Player</a:t>
+            </a:r>
+            <a:r>
+              <a:rPr lang="sk-SK" dirty="0"/>
+              <a:t> zdarma</a:t>
+            </a:r>
+          </a:p>
+          <a:p>
+            <a:pPr lvl="1">
+              <a:buFont typeface="Arial" panose="020B0604020202020204" pitchFamily="34" charset="0"/>
+              <a:buChar char="•"/>
+            </a:pPr>
+            <a:r>
+              <a:rPr lang="sk-SK" dirty="0" err="1"/>
+              <a:t>Vysor</a:t>
+            </a:r>
+            <a:r>
+              <a:rPr lang="sk-SK" dirty="0"/>
+              <a:t> v </a:t>
+            </a:r>
+            <a:r>
+              <a:rPr lang="sk-SK" dirty="0" err="1"/>
+              <a:t>základním</a:t>
+            </a:r>
+            <a:r>
+              <a:rPr lang="sk-SK" dirty="0"/>
+              <a:t> režimu zdarma, vyšší rozlíšení </a:t>
+            </a:r>
+            <a:r>
+              <a:rPr lang="sk-SK" dirty="0" err="1"/>
+              <a:t>placené</a:t>
             </a:r>
             <a:endParaRPr lang="sk-SK" dirty="0"/>
           </a:p>
@@ -44784,21 +44899,11 @@
             </a:pPr>
             <a:r>
               <a:rPr lang="sk-SK" dirty="0"/>
-              <a:t> Device Log</a:t>
-            </a:r>
-          </a:p>
-          <a:p>
-            <a:pPr lvl="1">
-              <a:buFont typeface="Arial" panose="020B0604020202020204" pitchFamily="34" charset="0"/>
-              <a:buChar char="•"/>
-            </a:pPr>
-            <a:r>
-              <a:rPr lang="sk-SK" dirty="0"/>
-              <a:t>Zobrazení logu </a:t>
+              <a:t> </a:t>
             </a:r>
             <a:r>
               <a:rPr lang="sk-SK" dirty="0" err="1"/>
-              <a:t>přímo</a:t>
+              <a:t>adb</a:t>
             </a:r>
             <a:r>
               <a:rPr lang="sk-SK" dirty="0"/>
@@ -44806,15 +44911,7 @@
             </a:r>
             <a:r>
               <a:rPr lang="sk-SK" dirty="0" err="1"/>
-              <a:t>ze</a:t>
-            </a:r>
-            <a:r>
-              <a:rPr lang="sk-SK" dirty="0"/>
-              <a:t> </a:t>
-            </a:r>
-            <a:r>
-              <a:rPr lang="sk-SK" dirty="0" err="1"/>
-              <a:t>zařízení</a:t>
+              <a:t>uninstall</a:t>
             </a:r>
             <a:endParaRPr lang="sk-SK" dirty="0"/>
           </a:p>
@@ -44825,7 +44922,7 @@
             </a:pPr>
             <a:r>
               <a:rPr lang="sk-SK" dirty="0" err="1"/>
-              <a:t>Možnost</a:t>
+              <a:t>Pokud</a:t>
             </a:r>
             <a:r>
               <a:rPr lang="sk-SK" dirty="0"/>
@@ -44833,7 +44930,7 @@
             </a:r>
             <a:r>
               <a:rPr lang="sk-SK" dirty="0" err="1"/>
-              <a:t>filtrovat</a:t>
+              <a:t>opravdu</a:t>
             </a:r>
             <a:r>
               <a:rPr lang="sk-SK" dirty="0"/>
@@ -44841,19 +44938,19 @@
             </a:r>
             <a:r>
               <a:rPr lang="sk-SK" dirty="0" err="1"/>
-              <a:t>zprávy</a:t>
+              <a:t>potřebujete</a:t>
             </a:r>
             <a:r>
               <a:rPr lang="sk-SK" dirty="0"/>
-              <a:t> pro </a:t>
+              <a:t> </a:t>
             </a:r>
             <a:r>
               <a:rPr lang="sk-SK" dirty="0" err="1"/>
-              <a:t>telefon</a:t>
+              <a:t>odinstalovat</a:t>
             </a:r>
             <a:r>
               <a:rPr lang="sk-SK" dirty="0"/>
-              <a:t> nebo pro </a:t>
+              <a:t> </a:t>
             </a:r>
             <a:r>
               <a:rPr lang="sk-SK" dirty="0" err="1"/>
@@ -44861,16 +44958,55 @@
             </a:r>
             <a:r>
               <a:rPr lang="sk-SK" dirty="0"/>
-              <a:t> (</a:t>
+              <a:t> z Androidu „</a:t>
             </a:r>
             <a:r>
               <a:rPr lang="sk-SK" dirty="0" err="1"/>
-              <a:t>adb</a:t>
+              <a:t>se</a:t>
             </a:r>
             <a:r>
               <a:rPr lang="sk-SK" dirty="0"/>
-              <a:t>)</a:t>
-            </a:r>
+              <a:t> </a:t>
+            </a:r>
+            <a:r>
+              <a:rPr lang="sk-SK" dirty="0" err="1"/>
+              <a:t>vším</a:t>
+            </a:r>
+            <a:r>
+              <a:rPr lang="sk-SK" dirty="0"/>
+              <a:t> </a:t>
+            </a:r>
+            <a:r>
+              <a:rPr lang="sk-SK" dirty="0" err="1"/>
+              <a:t>všudy</a:t>
+            </a:r>
+            <a:r>
+              <a:rPr lang="sk-SK" dirty="0"/>
+              <a:t>“</a:t>
+            </a:r>
+          </a:p>
+          <a:p>
+            <a:pPr>
+              <a:buFont typeface="Arial" panose="020B0604020202020204" pitchFamily="34" charset="0"/>
+              <a:buChar char="•"/>
+            </a:pPr>
+            <a:r>
+              <a:rPr lang="sk-SK" dirty="0"/>
+              <a:t> Show </a:t>
+            </a:r>
+            <a:r>
+              <a:rPr lang="sk-SK" dirty="0" err="1"/>
+              <a:t>Layout</a:t>
+            </a:r>
+            <a:r>
+              <a:rPr lang="sk-SK" dirty="0"/>
+              <a:t> </a:t>
+            </a:r>
+            <a:r>
+              <a:rPr lang="sk-SK" dirty="0" err="1"/>
+              <a:t>Boundaries</a:t>
+            </a:r>
+            <a:endParaRPr lang="sk-SK" dirty="0"/>
           </a:p>
           <a:p>
             <a:pPr lvl="1">
@@ -44878,57 +45014,24 @@
               <a:buChar char="•"/>
             </a:pPr>
             <a:r>
-              <a:rPr lang="sk-SK" dirty="0"/>
-              <a:t>Existuje pro Android i </a:t>
-            </a:r>
-            <a:r>
-              <a:rPr lang="sk-SK" dirty="0" err="1"/>
-              <a:t>iOS</a:t>
-            </a:r>
-            <a:endParaRPr lang="sk-SK" dirty="0"/>
-          </a:p>
-          <a:p>
-            <a:pPr>
-              <a:buFont typeface="Arial" panose="020B0604020202020204" pitchFamily="34" charset="0"/>
-              <a:buChar char="•"/>
-            </a:pPr>
-            <a:r>
-              <a:rPr lang="sk-SK" dirty="0"/>
-              <a:t> Output</a:t>
-            </a:r>
-          </a:p>
-          <a:p>
-            <a:pPr lvl="1">
-              <a:buFont typeface="Arial" panose="020B0604020202020204" pitchFamily="34" charset="0"/>
-              <a:buChar char="•"/>
-            </a:pPr>
-            <a:r>
               <a:rPr lang="sk-SK" dirty="0" err="1"/>
               <a:t>Pokud</a:t>
             </a:r>
             <a:r>
               <a:rPr lang="sk-SK" dirty="0"/>
-              <a:t> </a:t>
+              <a:t> chcete </a:t>
             </a:r>
             <a:r>
               <a:rPr lang="sk-SK" dirty="0" err="1"/>
-              <a:t>není</a:t>
+              <a:t>vidět</a:t>
             </a:r>
             <a:r>
               <a:rPr lang="sk-SK" dirty="0"/>
-              <a:t> chyba nikde </a:t>
+              <a:t> ohraničení </a:t>
             </a:r>
             <a:r>
               <a:rPr lang="sk-SK" dirty="0" err="1"/>
-              <a:t>jinde</a:t>
-            </a:r>
-            <a:r>
-              <a:rPr lang="sk-SK" dirty="0"/>
-              <a:t>, </a:t>
-            </a:r>
-            <a:r>
-              <a:rPr lang="sk-SK" dirty="0" err="1"/>
-              <a:t>zkuste</a:t>
+              <a:t>všech</a:t>
             </a:r>
             <a:r>
               <a:rPr lang="sk-SK" dirty="0"/>
@@ -44936,6 +45039,14 @@
             </a:r>
             <a:r>
               <a:rPr lang="sk-SK" dirty="0" err="1"/>
+              <a:t>prvků</a:t>
+            </a:r>
+            <a:r>
+              <a:rPr lang="sk-SK" dirty="0"/>
+              <a:t> – hodí </a:t>
+            </a:r>
+            <a:r>
+              <a:rPr lang="sk-SK" dirty="0" err="1"/>
               <a:t>se</a:t>
             </a:r>
             <a:r>
@@ -44944,7 +45055,7 @@
             </a:r>
             <a:r>
               <a:rPr lang="sk-SK" dirty="0" err="1"/>
-              <a:t>podívat</a:t>
+              <a:t>při</a:t>
             </a:r>
             <a:r>
               <a:rPr lang="sk-SK" dirty="0"/>
@@ -44952,21 +45063,7 @@
             </a:r>
             <a:r>
               <a:rPr lang="sk-SK" dirty="0" err="1"/>
-              <a:t>ještě</a:t>
-            </a:r>
-            <a:r>
-              <a:rPr lang="sk-SK" dirty="0"/>
-              <a:t> sem</a:t>
-            </a:r>
-          </a:p>
-          <a:p>
-            <a:pPr lvl="1">
-              <a:buFont typeface="Arial" panose="020B0604020202020204" pitchFamily="34" charset="0"/>
-              <a:buChar char="•"/>
-            </a:pPr>
-            <a:r>
-              <a:rPr lang="sk-SK" dirty="0" err="1"/>
-              <a:t>Někdy</a:t>
+              <a:t>ladění</a:t>
             </a:r>
             <a:r>
               <a:rPr lang="sk-SK" dirty="0"/>
@@ -44974,55 +45071,7 @@
             </a:r>
             <a:r>
               <a:rPr lang="sk-SK" dirty="0" err="1"/>
-              <a:t>se</a:t>
-            </a:r>
-            <a:r>
-              <a:rPr lang="sk-SK" dirty="0"/>
-              <a:t> </a:t>
-            </a:r>
-            <a:r>
-              <a:rPr lang="sk-SK" dirty="0" err="1"/>
-              <a:t>potkáte</a:t>
-            </a:r>
-            <a:r>
-              <a:rPr lang="sk-SK" dirty="0"/>
-              <a:t> s chybou z </a:t>
-            </a:r>
-            <a:r>
-              <a:rPr lang="sk-SK" dirty="0" err="1"/>
-              <a:t>nativního</a:t>
-            </a:r>
-            <a:r>
-              <a:rPr lang="sk-SK" dirty="0"/>
-              <a:t> jazyka – ale </a:t>
-            </a:r>
-            <a:r>
-              <a:rPr lang="sk-SK" dirty="0" err="1"/>
-              <a:t>alespoň</a:t>
-            </a:r>
-            <a:r>
-              <a:rPr lang="sk-SK" dirty="0"/>
-              <a:t> </a:t>
-            </a:r>
-            <a:r>
-              <a:rPr lang="sk-SK" dirty="0" err="1"/>
-              <a:t>víte</a:t>
-            </a:r>
-            <a:r>
-              <a:rPr lang="sk-SK" dirty="0"/>
-              <a:t> </a:t>
-            </a:r>
-            <a:r>
-              <a:rPr lang="sk-SK" dirty="0" err="1"/>
-              <a:t>co</a:t>
-            </a:r>
-            <a:r>
-              <a:rPr lang="sk-SK" dirty="0"/>
-              <a:t> máte </a:t>
-            </a:r>
-            <a:r>
-              <a:rPr lang="sk-SK" dirty="0" err="1"/>
-              <a:t>hledat</a:t>
+              <a:t>layoutů</a:t>
             </a:r>
             <a:endParaRPr lang="sk-SK" dirty="0"/>
           </a:p>
@@ -45031,7 +45080,7 @@
     </p:spTree>
     <p:extLst>
       <p:ext uri="{BB962C8B-B14F-4D97-AF65-F5344CB8AC3E}">
-        <p14:creationId xmlns:p14="http://schemas.microsoft.com/office/powerpoint/2010/main" val="916259010"/>
+        <p14:creationId xmlns:p14="http://schemas.microsoft.com/office/powerpoint/2010/main" val="779747416"/>
       </p:ext>
     </p:extLst>
   </p:cSld>
@@ -45120,33 +45169,15 @@
                                   </p:childTnLst>
                                 </p:cTn>
                               </p:par>
-                            </p:childTnLst>
-                          </p:cTn>
-                        </p:par>
-                      </p:childTnLst>
-                    </p:cTn>
-                  </p:par>
-                  <p:par>
-                    <p:cTn id="9" fill="hold">
-                      <p:stCondLst>
-                        <p:cond delay="indefinite"/>
-                      </p:stCondLst>
-                      <p:childTnLst>
-                        <p:par>
-                          <p:cTn id="10" fill="hold">
-                            <p:stCondLst>
-                              <p:cond delay="0"/>
-                            </p:stCondLst>
-                            <p:childTnLst>
                               <p:par>
-                                <p:cTn id="11" presetID="1" presetClass="entr" presetSubtype="0" fill="hold" grpId="0" nodeType="clickEffect">
+                                <p:cTn id="9" presetID="1" presetClass="entr" presetSubtype="0" fill="hold" grpId="0" nodeType="withEffect">
                                   <p:stCondLst>
                                     <p:cond delay="0"/>
                                   </p:stCondLst>
                                   <p:childTnLst>
                                     <p:set>
                                       <p:cBhvr>
-                                        <p:cTn id="12" dur="1" fill="hold">
+                                        <p:cTn id="10" dur="1" fill="hold">
                                           <p:stCondLst>
                                             <p:cond delay="0"/>
                                           </p:stCondLst>
@@ -45169,8 +45200,26 @@
                                   </p:childTnLst>
                                 </p:cTn>
                               </p:par>
+                            </p:childTnLst>
+                          </p:cTn>
+                        </p:par>
+                      </p:childTnLst>
+                    </p:cTn>
+                  </p:par>
+                  <p:par>
+                    <p:cTn id="11" fill="hold">
+                      <p:stCondLst>
+                        <p:cond delay="indefinite"/>
+                      </p:stCondLst>
+                      <p:childTnLst>
+                        <p:par>
+                          <p:cTn id="12" fill="hold">
+                            <p:stCondLst>
+                              <p:cond delay="0"/>
+                            </p:stCondLst>
+                            <p:childTnLst>
                               <p:par>
-                                <p:cTn id="13" presetID="1" presetClass="entr" presetSubtype="0" fill="hold" grpId="0" nodeType="withEffect">
+                                <p:cTn id="13" presetID="1" presetClass="entr" presetSubtype="0" fill="hold" grpId="0" nodeType="clickEffect">
                                   <p:stCondLst>
                                     <p:cond delay="0"/>
                                   </p:stCondLst>
@@ -45262,33 +45311,15 @@
                                   </p:childTnLst>
                                 </p:cTn>
                               </p:par>
-                            </p:childTnLst>
-                          </p:cTn>
-                        </p:par>
-                      </p:childTnLst>
-                    </p:cTn>
-                  </p:par>
-                  <p:par>
-                    <p:cTn id="19" fill="hold">
-                      <p:stCondLst>
-                        <p:cond delay="indefinite"/>
-                      </p:stCondLst>
-                      <p:childTnLst>
-                        <p:par>
-                          <p:cTn id="20" fill="hold">
-                            <p:stCondLst>
-                              <p:cond delay="0"/>
-                            </p:stCondLst>
-                            <p:childTnLst>
                               <p:par>
-                                <p:cTn id="21" presetID="1" presetClass="entr" presetSubtype="0" fill="hold" grpId="0" nodeType="clickEffect">
+                                <p:cTn id="19" presetID="1" presetClass="entr" presetSubtype="0" fill="hold" grpId="0" nodeType="withEffect">
                                   <p:stCondLst>
                                     <p:cond delay="0"/>
                                   </p:stCondLst>
                                   <p:childTnLst>
                                     <p:set>
                                       <p:cBhvr>
-                                        <p:cTn id="22" dur="1" fill="hold">
+                                        <p:cTn id="20" dur="1" fill="hold">
                                           <p:stCondLst>
                                             <p:cond delay="0"/>
                                           </p:stCondLst>
@@ -45311,8 +45342,26 @@
                                   </p:childTnLst>
                                 </p:cTn>
                               </p:par>
+                            </p:childTnLst>
+                          </p:cTn>
+                        </p:par>
+                      </p:childTnLst>
+                    </p:cTn>
+                  </p:par>
+                  <p:par>
+                    <p:cTn id="21" fill="hold">
+                      <p:stCondLst>
+                        <p:cond delay="indefinite"/>
+                      </p:stCondLst>
+                      <p:childTnLst>
+                        <p:par>
+                          <p:cTn id="22" fill="hold">
+                            <p:stCondLst>
+                              <p:cond delay="0"/>
+                            </p:stCondLst>
+                            <p:childTnLst>
                               <p:par>
-                                <p:cTn id="23" presetID="1" presetClass="entr" presetSubtype="0" fill="hold" grpId="0" nodeType="withEffect">
+                                <p:cTn id="23" presetID="1" presetClass="entr" presetSubtype="0" fill="hold" grpId="0" nodeType="clickEffect">
                                   <p:stCondLst>
                                     <p:cond delay="0"/>
                                   </p:stCondLst>
@@ -45359,6 +45408,86 @@
                                           <p:spTgt spid="3">
                                             <p:txEl>
                                               <p:pRg st="8" end="8"/>
+                                            </p:txEl>
+                                          </p:spTgt>
+                                        </p:tgtEl>
+                                        <p:attrNameLst>
+                                          <p:attrName>style.visibility</p:attrName>
+                                        </p:attrNameLst>
+                                      </p:cBhvr>
+                                      <p:to>
+                                        <p:strVal val="visible"/>
+                                      </p:to>
+                                    </p:set>
+                                  </p:childTnLst>
+                                </p:cTn>
+                              </p:par>
+                            </p:childTnLst>
+                          </p:cTn>
+                        </p:par>
+                      </p:childTnLst>
+                    </p:cTn>
+                  </p:par>
+                  <p:par>
+                    <p:cTn id="27" fill="hold">
+                      <p:stCondLst>
+                        <p:cond delay="indefinite"/>
+                      </p:stCondLst>
+                      <p:childTnLst>
+                        <p:par>
+                          <p:cTn id="28" fill="hold">
+                            <p:stCondLst>
+                              <p:cond delay="0"/>
+                            </p:stCondLst>
+                            <p:childTnLst>
+                              <p:par>
+                                <p:cTn id="29" presetID="1" presetClass="entr" presetSubtype="0" fill="hold" grpId="0" nodeType="clickEffect">
+                                  <p:stCondLst>
+                                    <p:cond delay="0"/>
+                                  </p:stCondLst>
+                                  <p:childTnLst>
+                                    <p:set>
+                                      <p:cBhvr>
+                                        <p:cTn id="30" dur="1" fill="hold">
+                                          <p:stCondLst>
+                                            <p:cond delay="0"/>
+                                          </p:stCondLst>
+                                        </p:cTn>
+                                        <p:tgtEl>
+                                          <p:spTgt spid="3">
+                                            <p:txEl>
+                                              <p:pRg st="9" end="9"/>
+                                            </p:txEl>
+                                          </p:spTgt>
+                                        </p:tgtEl>
+                                        <p:attrNameLst>
+                                          <p:attrName>style.visibility</p:attrName>
+                                        </p:attrNameLst>
+                                      </p:cBhvr>
+                                      <p:to>
+                                        <p:strVal val="visible"/>
+                                      </p:to>
+                                    </p:set>
+                                  </p:childTnLst>
+                                </p:cTn>
+                              </p:par>
+                              <p:par>
+                                <p:cTn id="31" presetID="1" presetClass="entr" presetSubtype="0" fill="hold" grpId="0" nodeType="withEffect">
+                                  <p:stCondLst>
+                                    <p:cond delay="0"/>
+                                  </p:stCondLst>
+                                  <p:childTnLst>
+                                    <p:set>
+                                      <p:cBhvr>
+                                        <p:cTn id="32" dur="1" fill="hold">
+                                          <p:stCondLst>
+                                            <p:cond delay="0"/>
+                                          </p:stCondLst>
+                                        </p:cTn>
+                                        <p:tgtEl>
+                                          <p:spTgt spid="3">
+                                            <p:txEl>
+                                              <p:pRg st="10" end="10"/>
                                             </p:txEl>
                                           </p:spTgt>
                                         </p:tgtEl>
@@ -45614,12 +45743,20 @@
           <a:p>
             <a:pPr algn="l"/>
             <a:r>
+              <a:rPr lang="sk-SK" sz="6000" dirty="0">
+                <a:solidFill>
+                  <a:srgbClr val="FFFFFF"/>
+                </a:solidFill>
+              </a:rPr>
+              <a:t>Práce s </a:t>
+            </a:r>
+            <a:r>
               <a:rPr lang="sk-SK" sz="6000" dirty="0" err="1">
                 <a:solidFill>
                   <a:srgbClr val="FFFFFF"/>
                 </a:solidFill>
               </a:rPr>
-              <a:t>debuggování</a:t>
+              <a:t>telefonem</a:t>
             </a:r>
             <a:endParaRPr lang="en-US" sz="6000" dirty="0">
               <a:solidFill>
@@ -45632,7 +45769,7 @@
     </p:spTree>
     <p:extLst>
       <p:ext uri="{BB962C8B-B14F-4D97-AF65-F5344CB8AC3E}">
-        <p14:creationId xmlns:p14="http://schemas.microsoft.com/office/powerpoint/2010/main" val="2620531651"/>
+        <p14:creationId xmlns:p14="http://schemas.microsoft.com/office/powerpoint/2010/main" val="889197125"/>
       </p:ext>
     </p:extLst>
   </p:cSld>
@@ -52450,7 +52587,7 @@
           <p:cNvPr id="2" name="Title 1">
             <a:extLst>
               <a:ext uri="{FF2B5EF4-FFF2-40B4-BE49-F238E27FC236}">
-                <a16:creationId xmlns:a16="http://schemas.microsoft.com/office/drawing/2014/main" id="{998C28BD-DA8B-42D2-91AD-871797D664C5}"/>
+                <a16:creationId xmlns:a16="http://schemas.microsoft.com/office/drawing/2014/main" id="{0103BE05-8EF7-4510-9EFA-506F351DB22A}"/>
               </a:ext>
             </a:extLst>
           </p:cNvPr>
@@ -52467,9 +52604,18 @@
           <a:lstStyle/>
           <a:p>
             <a:r>
-              <a:rPr lang="cs-CZ" dirty="0"/>
-              <a:t>Užitečné nástroje – práce s telefonem</a:t>
-            </a:r>
+              <a:rPr lang="sk-SK" dirty="0" err="1"/>
+              <a:t>Užitečné</a:t>
+            </a:r>
+            <a:r>
+              <a:rPr lang="sk-SK" dirty="0"/>
+              <a:t> nástroje – </a:t>
+            </a:r>
+            <a:r>
+              <a:rPr lang="sk-SK" dirty="0" err="1"/>
+              <a:t>debuggování</a:t>
+            </a:r>
+            <a:endParaRPr lang="en-US" dirty="0"/>
           </a:p>
         </p:txBody>
       </p:sp>
@@ -52478,7 +52624,7 @@
           <p:cNvPr id="3" name="Content Placeholder 2">
             <a:extLst>
               <a:ext uri="{FF2B5EF4-FFF2-40B4-BE49-F238E27FC236}">
-                <a16:creationId xmlns:a16="http://schemas.microsoft.com/office/drawing/2014/main" id="{8C995FE1-285B-4A4A-A1F4-5D590309D79D}"/>
+                <a16:creationId xmlns:a16="http://schemas.microsoft.com/office/drawing/2014/main" id="{B79E931B-E621-4BB7-B0EB-4BD6348699F1}"/>
               </a:ext>
             </a:extLst>
           </p:cNvPr>
@@ -52491,9 +52637,7 @@
         </p:nvSpPr>
         <p:spPr/>
         <p:txBody>
-          <a:bodyPr>
-            <a:normAutofit lnSpcReduction="10000"/>
-          </a:bodyPr>
+          <a:bodyPr/>
           <a:lstStyle/>
           <a:p>
             <a:pPr>
@@ -52502,21 +52646,19 @@
             </a:pPr>
             <a:r>
               <a:rPr lang="sk-SK" dirty="0"/>
+              <a:t> XAML </a:t>
+            </a:r>
+            <a:r>
+              <a:rPr lang="sk-SK" dirty="0" err="1"/>
+              <a:t>Binding</a:t>
+            </a:r>
+            <a:r>
+              <a:rPr lang="sk-SK" dirty="0"/>
               <a:t> </a:t>
             </a:r>
             <a:r>
               <a:rPr lang="sk-SK" dirty="0" err="1"/>
-              <a:t>scrcpy</a:t>
-            </a:r>
-            <a:r>
-              <a:rPr lang="sk-SK" dirty="0"/>
-              <a:t> - </a:t>
-            </a:r>
-            <a:r>
-              <a:rPr lang="sk-SK" dirty="0">
-                <a:hlinkClick r:id="rId2"/>
-              </a:rPr>
-              <a:t>https://github.com/Genymobile/scrcpy</a:t>
+              <a:t>Failures</a:t>
             </a:r>
             <a:endParaRPr lang="sk-SK" dirty="0"/>
           </a:p>
@@ -52526,24 +52668,12 @@
               <a:buChar char="•"/>
             </a:pPr>
             <a:r>
+              <a:rPr lang="sk-SK" dirty="0"/>
+              <a:t>Zobrazí chyby v </a:t>
+            </a:r>
+            <a:r>
               <a:rPr lang="sk-SK" dirty="0" err="1"/>
-              <a:t>Zobrazování</a:t>
-            </a:r>
-            <a:r>
-              <a:rPr lang="sk-SK" dirty="0"/>
-              <a:t> obrazovky </a:t>
-            </a:r>
-            <a:r>
-              <a:rPr lang="sk-SK" dirty="0" err="1"/>
-              <a:t>telefonu</a:t>
-            </a:r>
-            <a:r>
-              <a:rPr lang="sk-SK" dirty="0"/>
-              <a:t> na PC + </a:t>
-            </a:r>
-            <a:r>
-              <a:rPr lang="sk-SK" dirty="0" err="1"/>
-              <a:t>možnost</a:t>
+              <a:t>bindingu</a:t>
             </a:r>
             <a:r>
               <a:rPr lang="sk-SK" dirty="0"/>
@@ -52551,7 +52681,64 @@
             </a:r>
             <a:r>
               <a:rPr lang="sk-SK" dirty="0" err="1"/>
-              <a:t>interakce</a:t>
+              <a:t>při</a:t>
+            </a:r>
+            <a:r>
+              <a:rPr lang="sk-SK" dirty="0"/>
+              <a:t> </a:t>
+            </a:r>
+            <a:r>
+              <a:rPr lang="sk-SK" dirty="0" err="1"/>
+              <a:t>kompilaci</a:t>
+            </a:r>
+            <a:r>
+              <a:rPr lang="sk-SK" dirty="0"/>
+              <a:t> i za </a:t>
+            </a:r>
+            <a:r>
+              <a:rPr lang="sk-SK" dirty="0" err="1"/>
+              <a:t>běhu</a:t>
+            </a:r>
+            <a:endParaRPr lang="sk-SK" dirty="0"/>
+          </a:p>
+          <a:p>
+            <a:pPr>
+              <a:buFont typeface="Arial" panose="020B0604020202020204" pitchFamily="34" charset="0"/>
+              <a:buChar char="•"/>
+            </a:pPr>
+            <a:r>
+              <a:rPr lang="sk-SK" dirty="0"/>
+              <a:t> Device Log</a:t>
+            </a:r>
+          </a:p>
+          <a:p>
+            <a:pPr lvl="1">
+              <a:buFont typeface="Arial" panose="020B0604020202020204" pitchFamily="34" charset="0"/>
+              <a:buChar char="•"/>
+            </a:pPr>
+            <a:r>
+              <a:rPr lang="sk-SK" dirty="0"/>
+              <a:t>Zobrazení logu </a:t>
+            </a:r>
+            <a:r>
+              <a:rPr lang="sk-SK" dirty="0" err="1"/>
+              <a:t>přímo</a:t>
+            </a:r>
+            <a:r>
+              <a:rPr lang="sk-SK" dirty="0"/>
+              <a:t> </a:t>
+            </a:r>
+            <a:r>
+              <a:rPr lang="sk-SK" dirty="0" err="1"/>
+              <a:t>ze</a:t>
+            </a:r>
+            <a:r>
+              <a:rPr lang="sk-SK" dirty="0"/>
+              <a:t> </a:t>
+            </a:r>
+            <a:r>
+              <a:rPr lang="sk-SK" dirty="0" err="1"/>
+              <a:t>zařízení</a:t>
             </a:r>
             <a:endParaRPr lang="sk-SK" dirty="0"/>
           </a:p>
@@ -52561,38 +52748,16 @@
               <a:buChar char="•"/>
             </a:pPr>
             <a:r>
-              <a:rPr lang="sk-SK" dirty="0"/>
-              <a:t>CLI nástroj, jednoduchý </a:t>
-            </a:r>
-            <a:r>
               <a:rPr lang="sk-SK" dirty="0" err="1"/>
-              <a:t>setup</a:t>
-            </a:r>
-            <a:r>
-              <a:rPr lang="sk-SK" dirty="0"/>
-              <a:t>, </a:t>
-            </a:r>
-            <a:r>
-              <a:rPr lang="sk-SK" dirty="0" err="1"/>
-              <a:t>free</a:t>
-            </a:r>
-            <a:r>
-              <a:rPr lang="sk-SK" dirty="0"/>
-              <a:t>, pro Android</a:t>
-            </a:r>
-          </a:p>
-          <a:p>
-            <a:pPr>
-              <a:buFont typeface="Arial" panose="020B0604020202020204" pitchFamily="34" charset="0"/>
-              <a:buChar char="•"/>
-            </a:pPr>
+              <a:t>Možnost</a:t>
+            </a:r>
             <a:r>
               <a:rPr lang="sk-SK" dirty="0"/>
               <a:t> </a:t>
             </a:r>
             <a:r>
               <a:rPr lang="sk-SK" dirty="0" err="1"/>
-              <a:t>QuickTime</a:t>
+              <a:t>filtrovat</a:t>
             </a:r>
             <a:r>
               <a:rPr lang="sk-SK" dirty="0"/>
@@ -52600,17 +52765,36 @@
             </a:r>
             <a:r>
               <a:rPr lang="sk-SK" dirty="0" err="1"/>
-              <a:t>Player</a:t>
+              <a:t>zprávy</a:t>
             </a:r>
             <a:r>
               <a:rPr lang="sk-SK" dirty="0"/>
-              <a:t>, </a:t>
+              <a:t> pro </a:t>
             </a:r>
             <a:r>
               <a:rPr lang="sk-SK" dirty="0" err="1"/>
-              <a:t>Vysor</a:t>
-            </a:r>
-            <a:endParaRPr lang="sk-SK" dirty="0"/>
+              <a:t>telefon</a:t>
+            </a:r>
+            <a:r>
+              <a:rPr lang="sk-SK" dirty="0"/>
+              <a:t> nebo pro </a:t>
+            </a:r>
+            <a:r>
+              <a:rPr lang="sk-SK" dirty="0" err="1"/>
+              <a:t>aplikaci</a:t>
+            </a:r>
+            <a:r>
+              <a:rPr lang="sk-SK" dirty="0"/>
+              <a:t> (</a:t>
+            </a:r>
+            <a:r>
+              <a:rPr lang="sk-SK" dirty="0" err="1"/>
+              <a:t>adb</a:t>
+            </a:r>
+            <a:r>
+              <a:rPr lang="sk-SK" dirty="0"/>
+              <a:t>)</a:t>
+            </a:r>
           </a:p>
           <a:p>
             <a:pPr lvl="1">
@@ -52618,64 +52802,12 @@
               <a:buChar char="•"/>
             </a:pPr>
             <a:r>
+              <a:rPr lang="sk-SK" dirty="0"/>
+              <a:t>Existuje pro Android i </a:t>
+            </a:r>
+            <a:r>
               <a:rPr lang="sk-SK" dirty="0" err="1"/>
-              <a:t>Zobrazování</a:t>
-            </a:r>
-            <a:r>
-              <a:rPr lang="sk-SK" dirty="0"/>
-              <a:t> obrazovky z iPhone (QT </a:t>
-            </a:r>
-            <a:r>
-              <a:rPr lang="sk-SK" dirty="0" err="1"/>
-              <a:t>Player</a:t>
-            </a:r>
-            <a:r>
-              <a:rPr lang="sk-SK" dirty="0"/>
-              <a:t> – Mac OS)</a:t>
-            </a:r>
-          </a:p>
-          <a:p>
-            <a:pPr lvl="1">
-              <a:buFont typeface="Arial" panose="020B0604020202020204" pitchFamily="34" charset="0"/>
-              <a:buChar char="•"/>
-            </a:pPr>
-            <a:r>
-              <a:rPr lang="sk-SK" dirty="0"/>
-              <a:t>QT </a:t>
-            </a:r>
-            <a:r>
-              <a:rPr lang="sk-SK" dirty="0" err="1"/>
-              <a:t>Player</a:t>
-            </a:r>
-            <a:r>
-              <a:rPr lang="sk-SK" dirty="0"/>
-              <a:t> zdarma</a:t>
-            </a:r>
-          </a:p>
-          <a:p>
-            <a:pPr lvl="1">
-              <a:buFont typeface="Arial" panose="020B0604020202020204" pitchFamily="34" charset="0"/>
-              <a:buChar char="•"/>
-            </a:pPr>
-            <a:r>
-              <a:rPr lang="sk-SK" dirty="0" err="1"/>
-              <a:t>Vysor</a:t>
-            </a:r>
-            <a:r>
-              <a:rPr lang="sk-SK" dirty="0"/>
-              <a:t> v </a:t>
-            </a:r>
-            <a:r>
-              <a:rPr lang="sk-SK" dirty="0" err="1"/>
-              <a:t>základním</a:t>
-            </a:r>
-            <a:r>
-              <a:rPr lang="sk-SK" dirty="0"/>
-              <a:t> režimu zdarma, vyšší rozlíšení </a:t>
-            </a:r>
-            <a:r>
-              <a:rPr lang="sk-SK" dirty="0" err="1"/>
-              <a:t>placené</a:t>
+              <a:t>iOS</a:t>
             </a:r>
             <a:endParaRPr lang="sk-SK" dirty="0"/>
           </a:p>
@@ -52686,21 +52818,8 @@
             </a:pPr>
             <a:r>
               <a:rPr lang="sk-SK" dirty="0"/>
-              <a:t> </a:t>
-            </a:r>
-            <a:r>
-              <a:rPr lang="sk-SK" dirty="0" err="1"/>
-              <a:t>adb</a:t>
-            </a:r>
-            <a:r>
-              <a:rPr lang="sk-SK" dirty="0"/>
-              <a:t> </a:t>
-            </a:r>
-            <a:r>
-              <a:rPr lang="sk-SK" dirty="0" err="1"/>
-              <a:t>uninstall</a:t>
-            </a:r>
-            <a:endParaRPr lang="sk-SK" dirty="0"/>
+              <a:t> Output</a:t>
+            </a:r>
           </a:p>
           <a:p>
             <a:pPr lvl="1">
@@ -52717,7 +52836,23 @@
             </a:r>
             <a:r>
               <a:rPr lang="sk-SK" dirty="0" err="1"/>
-              <a:t>opravdu</a:t>
+              <a:t>není</a:t>
+            </a:r>
+            <a:r>
+              <a:rPr lang="sk-SK" dirty="0"/>
+              <a:t> chyba nikde </a:t>
+            </a:r>
+            <a:r>
+              <a:rPr lang="sk-SK" dirty="0" err="1"/>
+              <a:t>jinde</a:t>
+            </a:r>
+            <a:r>
+              <a:rPr lang="sk-SK" dirty="0"/>
+              <a:t>, </a:t>
+            </a:r>
+            <a:r>
+              <a:rPr lang="sk-SK" dirty="0" err="1"/>
+              <a:t>zkuste</a:t>
             </a:r>
             <a:r>
               <a:rPr lang="sk-SK" dirty="0"/>
@@ -52725,7 +52860,7 @@
             </a:r>
             <a:r>
               <a:rPr lang="sk-SK" dirty="0" err="1"/>
-              <a:t>potřebujete</a:t>
+              <a:t>se</a:t>
             </a:r>
             <a:r>
               <a:rPr lang="sk-SK" dirty="0"/>
@@ -52733,7 +52868,7 @@
             </a:r>
             <a:r>
               <a:rPr lang="sk-SK" dirty="0" err="1"/>
-              <a:t>odinstalovat</a:t>
+              <a:t>podívat</a:t>
             </a:r>
             <a:r>
               <a:rPr lang="sk-SK" dirty="0"/>
@@ -52741,59 +52876,12 @@
             </a:r>
             <a:r>
               <a:rPr lang="sk-SK" dirty="0" err="1"/>
-              <a:t>aplikaci</a:t>
+              <a:t>ještě</a:t>
             </a:r>
             <a:r>
               <a:rPr lang="sk-SK" dirty="0"/>
-              <a:t> z Androidu „</a:t>
-            </a:r>
-            <a:r>
-              <a:rPr lang="sk-SK" dirty="0" err="1"/>
-              <a:t>se</a:t>
-            </a:r>
-            <a:r>
-              <a:rPr lang="sk-SK" dirty="0"/>
-              <a:t> </a:t>
-            </a:r>
-            <a:r>
-              <a:rPr lang="sk-SK" dirty="0" err="1"/>
-              <a:t>vším</a:t>
-            </a:r>
-            <a:r>
-              <a:rPr lang="sk-SK" dirty="0"/>
-              <a:t> </a:t>
-            </a:r>
-            <a:r>
-              <a:rPr lang="sk-SK" dirty="0" err="1"/>
-              <a:t>všudy</a:t>
-            </a:r>
-            <a:r>
-              <a:rPr lang="sk-SK" dirty="0"/>
-              <a:t>“</a:t>
-            </a:r>
-          </a:p>
-          <a:p>
-            <a:pPr>
-              <a:buFont typeface="Arial" panose="020B0604020202020204" pitchFamily="34" charset="0"/>
-              <a:buChar char="•"/>
-            </a:pPr>
-            <a:r>
-              <a:rPr lang="sk-SK" dirty="0"/>
-              <a:t> Show </a:t>
-            </a:r>
-            <a:r>
-              <a:rPr lang="sk-SK" dirty="0" err="1"/>
-              <a:t>Layout</a:t>
-            </a:r>
-            <a:r>
-              <a:rPr lang="sk-SK" dirty="0"/>
-              <a:t> </a:t>
-            </a:r>
-            <a:r>
-              <a:rPr lang="sk-SK" dirty="0" err="1"/>
-              <a:t>Boundaries</a:t>
-            </a:r>
-            <a:endParaRPr lang="sk-SK" dirty="0"/>
+              <a:t> sem</a:t>
+            </a:r>
           </a:p>
           <a:p>
             <a:pPr lvl="1">
@@ -52802,23 +52890,7 @@
             </a:pPr>
             <a:r>
               <a:rPr lang="sk-SK" dirty="0" err="1"/>
-              <a:t>Pokud</a:t>
-            </a:r>
-            <a:r>
-              <a:rPr lang="sk-SK" dirty="0"/>
-              <a:t> chcete </a:t>
-            </a:r>
-            <a:r>
-              <a:rPr lang="sk-SK" dirty="0" err="1"/>
-              <a:t>vidět</a:t>
-            </a:r>
-            <a:r>
-              <a:rPr lang="sk-SK" dirty="0"/>
-              <a:t> ohraničení </a:t>
-            </a:r>
-            <a:r>
-              <a:rPr lang="sk-SK" dirty="0" err="1"/>
-              <a:t>všech</a:t>
+              <a:t>Někdy</a:t>
             </a:r>
             <a:r>
               <a:rPr lang="sk-SK" dirty="0"/>
@@ -52826,14 +52898,6 @@
             </a:r>
             <a:r>
               <a:rPr lang="sk-SK" dirty="0" err="1"/>
-              <a:t>prvků</a:t>
-            </a:r>
-            <a:r>
-              <a:rPr lang="sk-SK" dirty="0"/>
-              <a:t> – hodí </a:t>
-            </a:r>
-            <a:r>
-              <a:rPr lang="sk-SK" dirty="0" err="1"/>
               <a:t>se</a:t>
             </a:r>
             <a:r>
@@ -52842,7 +52906,23 @@
             </a:r>
             <a:r>
               <a:rPr lang="sk-SK" dirty="0" err="1"/>
-              <a:t>při</a:t>
+              <a:t>potkáte</a:t>
+            </a:r>
+            <a:r>
+              <a:rPr lang="sk-SK" dirty="0"/>
+              <a:t> s chybou z </a:t>
+            </a:r>
+            <a:r>
+              <a:rPr lang="sk-SK" dirty="0" err="1"/>
+              <a:t>nativního</a:t>
+            </a:r>
+            <a:r>
+              <a:rPr lang="sk-SK" dirty="0"/>
+              <a:t> jazyka – ale </a:t>
+            </a:r>
+            <a:r>
+              <a:rPr lang="sk-SK" dirty="0" err="1"/>
+              <a:t>alespoň</a:t>
             </a:r>
             <a:r>
               <a:rPr lang="sk-SK" dirty="0"/>
@@ -52850,7 +52930,7 @@
             </a:r>
             <a:r>
               <a:rPr lang="sk-SK" dirty="0" err="1"/>
-              <a:t>ladění</a:t>
+              <a:t>víte</a:t>
             </a:r>
             <a:r>
               <a:rPr lang="sk-SK" dirty="0"/>
@@ -52858,7 +52938,15 @@
             </a:r>
             <a:r>
               <a:rPr lang="sk-SK" dirty="0" err="1"/>
-              <a:t>layoutů</a:t>
+              <a:t>co</a:t>
+            </a:r>
+            <a:r>
+              <a:rPr lang="sk-SK" dirty="0"/>
+              <a:t> máte </a:t>
+            </a:r>
+            <a:r>
+              <a:rPr lang="sk-SK" dirty="0" err="1"/>
+              <a:t>hledat</a:t>
             </a:r>
             <a:endParaRPr lang="sk-SK" dirty="0"/>
           </a:p>
@@ -52867,7 +52955,7 @@
     </p:spTree>
     <p:extLst>
       <p:ext uri="{BB962C8B-B14F-4D97-AF65-F5344CB8AC3E}">
-        <p14:creationId xmlns:p14="http://schemas.microsoft.com/office/powerpoint/2010/main" val="779747416"/>
+        <p14:creationId xmlns:p14="http://schemas.microsoft.com/office/powerpoint/2010/main" val="916259010"/>
       </p:ext>
     </p:extLst>
   </p:cSld>
@@ -52956,15 +53044,33 @@
                                   </p:childTnLst>
                                 </p:cTn>
                               </p:par>
+                            </p:childTnLst>
+                          </p:cTn>
+                        </p:par>
+                      </p:childTnLst>
+                    </p:cTn>
+                  </p:par>
+                  <p:par>
+                    <p:cTn id="9" fill="hold">
+                      <p:stCondLst>
+                        <p:cond delay="indefinite"/>
+                      </p:stCondLst>
+                      <p:childTnLst>
+                        <p:par>
+                          <p:cTn id="10" fill="hold">
+                            <p:stCondLst>
+                              <p:cond delay="0"/>
+                            </p:stCondLst>
+                            <p:childTnLst>
                               <p:par>
-                                <p:cTn id="9" presetID="1" presetClass="entr" presetSubtype="0" fill="hold" grpId="0" nodeType="withEffect">
+                                <p:cTn id="11" presetID="1" presetClass="entr" presetSubtype="0" fill="hold" grpId="0" nodeType="clickEffect">
                                   <p:stCondLst>
                                     <p:cond delay="0"/>
                                   </p:stCondLst>
                                   <p:childTnLst>
                                     <p:set>
                                       <p:cBhvr>
-                                        <p:cTn id="10" dur="1" fill="hold">
+                                        <p:cTn id="12" dur="1" fill="hold">
                                           <p:stCondLst>
                                             <p:cond delay="0"/>
                                           </p:stCondLst>
@@ -52987,26 +53093,8 @@
                                   </p:childTnLst>
                                 </p:cTn>
                               </p:par>
-                            </p:childTnLst>
-                          </p:cTn>
-                        </p:par>
-                      </p:childTnLst>
-                    </p:cTn>
-                  </p:par>
-                  <p:par>
-                    <p:cTn id="11" fill="hold">
-                      <p:stCondLst>
-                        <p:cond delay="indefinite"/>
-                      </p:stCondLst>
-                      <p:childTnLst>
-                        <p:par>
-                          <p:cTn id="12" fill="hold">
-                            <p:stCondLst>
-                              <p:cond delay="0"/>
-                            </p:stCondLst>
-                            <p:childTnLst>
                               <p:par>
-                                <p:cTn id="13" presetID="1" presetClass="entr" presetSubtype="0" fill="hold" grpId="0" nodeType="clickEffect">
+                                <p:cTn id="13" presetID="1" presetClass="entr" presetSubtype="0" fill="hold" grpId="0" nodeType="withEffect">
                                   <p:stCondLst>
                                     <p:cond delay="0"/>
                                   </p:stCondLst>
@@ -53098,15 +53186,33 @@
                                   </p:childTnLst>
                                 </p:cTn>
                               </p:par>
+                            </p:childTnLst>
+                          </p:cTn>
+                        </p:par>
+                      </p:childTnLst>
+                    </p:cTn>
+                  </p:par>
+                  <p:par>
+                    <p:cTn id="19" fill="hold">
+                      <p:stCondLst>
+                        <p:cond delay="indefinite"/>
+                      </p:stCondLst>
+                      <p:childTnLst>
+                        <p:par>
+                          <p:cTn id="20" fill="hold">
+                            <p:stCondLst>
+                              <p:cond delay="0"/>
+                            </p:stCondLst>
+                            <p:childTnLst>
                               <p:par>
-                                <p:cTn id="19" presetID="1" presetClass="entr" presetSubtype="0" fill="hold" grpId="0" nodeType="withEffect">
+                                <p:cTn id="21" presetID="1" presetClass="entr" presetSubtype="0" fill="hold" grpId="0" nodeType="clickEffect">
                                   <p:stCondLst>
                                     <p:cond delay="0"/>
                                   </p:stCondLst>
                                   <p:childTnLst>
                                     <p:set>
                                       <p:cBhvr>
-                                        <p:cTn id="20" dur="1" fill="hold">
+                                        <p:cTn id="22" dur="1" fill="hold">
                                           <p:stCondLst>
                                             <p:cond delay="0"/>
                                           </p:stCondLst>
@@ -53129,26 +53235,8 @@
                                   </p:childTnLst>
                                 </p:cTn>
                               </p:par>
-                            </p:childTnLst>
-                          </p:cTn>
-                        </p:par>
-                      </p:childTnLst>
-                    </p:cTn>
-                  </p:par>
-                  <p:par>
-                    <p:cTn id="21" fill="hold">
-                      <p:stCondLst>
-                        <p:cond delay="indefinite"/>
-                      </p:stCondLst>
-                      <p:childTnLst>
-                        <p:par>
-                          <p:cTn id="22" fill="hold">
-                            <p:stCondLst>
-                              <p:cond delay="0"/>
-                            </p:stCondLst>
-                            <p:childTnLst>
                               <p:par>
-                                <p:cTn id="23" presetID="1" presetClass="entr" presetSubtype="0" fill="hold" grpId="0" nodeType="clickEffect">
+                                <p:cTn id="23" presetID="1" presetClass="entr" presetSubtype="0" fill="hold" grpId="0" nodeType="withEffect">
                                   <p:stCondLst>
                                     <p:cond delay="0"/>
                                   </p:stCondLst>
@@ -53195,86 +53283,6 @@
                                           <p:spTgt spid="3">
                                             <p:txEl>
                                               <p:pRg st="8" end="8"/>
-                                            </p:txEl>
-                                          </p:spTgt>
-                                        </p:tgtEl>
-                                        <p:attrNameLst>
-                                          <p:attrName>style.visibility</p:attrName>
-                                        </p:attrNameLst>
-                                      </p:cBhvr>
-                                      <p:to>
-                                        <p:strVal val="visible"/>
-                                      </p:to>
-                                    </p:set>
-                                  </p:childTnLst>
-                                </p:cTn>
-                              </p:par>
-                            </p:childTnLst>
-                          </p:cTn>
-                        </p:par>
-                      </p:childTnLst>
-                    </p:cTn>
-                  </p:par>
-                  <p:par>
-                    <p:cTn id="27" fill="hold">
-                      <p:stCondLst>
-                        <p:cond delay="indefinite"/>
-                      </p:stCondLst>
-                      <p:childTnLst>
-                        <p:par>
-                          <p:cTn id="28" fill="hold">
-                            <p:stCondLst>
-                              <p:cond delay="0"/>
-                            </p:stCondLst>
-                            <p:childTnLst>
-                              <p:par>
-                                <p:cTn id="29" presetID="1" presetClass="entr" presetSubtype="0" fill="hold" grpId="0" nodeType="clickEffect">
-                                  <p:stCondLst>
-                                    <p:cond delay="0"/>
-                                  </p:stCondLst>
-                                  <p:childTnLst>
-                                    <p:set>
-                                      <p:cBhvr>
-                                        <p:cTn id="30" dur="1" fill="hold">
-                                          <p:stCondLst>
-                                            <p:cond delay="0"/>
-                                          </p:stCondLst>
-                                        </p:cTn>
-                                        <p:tgtEl>
-                                          <p:spTgt spid="3">
-                                            <p:txEl>
-                                              <p:pRg st="9" end="9"/>
-                                            </p:txEl>
-                                          </p:spTgt>
-                                        </p:tgtEl>
-                                        <p:attrNameLst>
-                                          <p:attrName>style.visibility</p:attrName>
-                                        </p:attrNameLst>
-                                      </p:cBhvr>
-                                      <p:to>
-                                        <p:strVal val="visible"/>
-                                      </p:to>
-                                    </p:set>
-                                  </p:childTnLst>
-                                </p:cTn>
-                              </p:par>
-                              <p:par>
-                                <p:cTn id="31" presetID="1" presetClass="entr" presetSubtype="0" fill="hold" grpId="0" nodeType="withEffect">
-                                  <p:stCondLst>
-                                    <p:cond delay="0"/>
-                                  </p:stCondLst>
-                                  <p:childTnLst>
-                                    <p:set>
-                                      <p:cBhvr>
-                                        <p:cTn id="32" dur="1" fill="hold">
-                                          <p:stCondLst>
-                                            <p:cond delay="0"/>
-                                          </p:stCondLst>
-                                        </p:cTn>
-                                        <p:tgtEl>
-                                          <p:spTgt spid="3">
-                                            <p:txEl>
-                                              <p:pRg st="10" end="10"/>
                                             </p:txEl>
                                           </p:spTgt>
                                         </p:tgtEl>
@@ -53530,20 +53538,12 @@
           <a:p>
             <a:pPr algn="l"/>
             <a:r>
-              <a:rPr lang="sk-SK" sz="6000" dirty="0">
-                <a:solidFill>
-                  <a:srgbClr val="FFFFFF"/>
-                </a:solidFill>
-              </a:rPr>
-              <a:t>Práce s </a:t>
-            </a:r>
-            <a:r>
               <a:rPr lang="sk-SK" sz="6000" dirty="0" err="1">
                 <a:solidFill>
                   <a:srgbClr val="FFFFFF"/>
                 </a:solidFill>
               </a:rPr>
-              <a:t>telefonem</a:t>
+              <a:t>debuggování</a:t>
             </a:r>
             <a:endParaRPr lang="en-US" sz="6000" dirty="0">
               <a:solidFill>
@@ -53556,7 +53556,7 @@
     </p:spTree>
     <p:extLst>
       <p:ext uri="{BB962C8B-B14F-4D97-AF65-F5344CB8AC3E}">
-        <p14:creationId xmlns:p14="http://schemas.microsoft.com/office/powerpoint/2010/main" val="889197125"/>
+        <p14:creationId xmlns:p14="http://schemas.microsoft.com/office/powerpoint/2010/main" val="2620531651"/>
       </p:ext>
     </p:extLst>
   </p:cSld>

</xml_diff>